<commit_message>
updated slides for lecture 5
</commit_message>
<xml_diff>
--- a/lectures/Lect05_Lasso.pptx
+++ b/lectures/Lect05_Lasso.pptx
@@ -12772,34 +12772,168 @@
       </p:sp>
       <p:pic>
         <p:nvPicPr>
-          <p:cNvPr id="6" name="Picture 5">
+          <p:cNvPr id="1026" name="Picture 2" descr="Image for post">
             <a:extLst>
               <a:ext uri="{FF2B5EF4-FFF2-40B4-BE49-F238E27FC236}">
-                <a16:creationId xmlns:a16="http://schemas.microsoft.com/office/drawing/2014/main" id="{AA8B7534-9B14-423E-B8BC-59FD88AA6D33}"/>
+                <a16:creationId xmlns:a16="http://schemas.microsoft.com/office/drawing/2014/main" id="{2FA4A6B6-360A-A544-B200-1BF69FBC1E21}"/>
               </a:ext>
             </a:extLst>
           </p:cNvPr>
           <p:cNvPicPr>
-            <a:picLocks noChangeAspect="1"/>
+            <a:picLocks noChangeAspect="1" noChangeArrowheads="1"/>
           </p:cNvPicPr>
           <p:nvPr/>
         </p:nvPicPr>
         <p:blipFill>
-          <a:blip r:embed="rId2"/>
+          <a:blip r:embed="rId2">
+            <a:extLst>
+              <a:ext uri="{28A0092B-C50C-407E-A947-70E740481C1C}">
+                <a14:useLocalDpi xmlns:a14="http://schemas.microsoft.com/office/drawing/2010/main" val="0"/>
+              </a:ext>
+            </a:extLst>
+          </a:blip>
+          <a:srcRect/>
           <a:stretch>
             <a:fillRect/>
           </a:stretch>
         </p:blipFill>
-        <p:spPr>
+        <p:spPr bwMode="auto">
           <a:xfrm>
-            <a:off x="6126480" y="2397502"/>
-            <a:ext cx="5145064" cy="2613366"/>
+            <a:off x="5570621" y="1988497"/>
+            <a:ext cx="3292024" cy="3880598"/>
           </a:xfrm>
           <a:prstGeom prst="rect">
             <a:avLst/>
           </a:prstGeom>
+          <a:noFill/>
+          <a:extLst>
+            <a:ext uri="{909E8E84-426E-40DD-AFC4-6F175D3DCCD1}">
+              <a14:hiddenFill xmlns:a14="http://schemas.microsoft.com/office/drawing/2010/main">
+                <a:solidFill>
+                  <a:srgbClr val="FFFFFF"/>
+                </a:solidFill>
+              </a14:hiddenFill>
+            </a:ext>
+          </a:extLst>
         </p:spPr>
       </p:pic>
+      <p:pic>
+        <p:nvPicPr>
+          <p:cNvPr id="1028" name="Picture 4" descr="Image for post">
+            <a:extLst>
+              <a:ext uri="{FF2B5EF4-FFF2-40B4-BE49-F238E27FC236}">
+                <a16:creationId xmlns:a16="http://schemas.microsoft.com/office/drawing/2014/main" id="{A05EB62A-3556-A442-B2F7-0A497E73F5E5}"/>
+              </a:ext>
+            </a:extLst>
+          </p:cNvPr>
+          <p:cNvPicPr>
+            <a:picLocks noChangeAspect="1" noChangeArrowheads="1"/>
+          </p:cNvPicPr>
+          <p:nvPr/>
+        </p:nvPicPr>
+        <p:blipFill>
+          <a:blip r:embed="rId3">
+            <a:extLst>
+              <a:ext uri="{28A0092B-C50C-407E-A947-70E740481C1C}">
+                <a14:useLocalDpi xmlns:a14="http://schemas.microsoft.com/office/drawing/2010/main" val="0"/>
+              </a:ext>
+            </a:extLst>
+          </a:blip>
+          <a:srcRect/>
+          <a:stretch>
+            <a:fillRect/>
+          </a:stretch>
+        </p:blipFill>
+        <p:spPr bwMode="auto">
+          <a:xfrm>
+            <a:off x="8780763" y="1883130"/>
+            <a:ext cx="3236223" cy="3985964"/>
+          </a:xfrm>
+          <a:prstGeom prst="rect">
+            <a:avLst/>
+          </a:prstGeom>
+          <a:noFill/>
+          <a:extLst>
+            <a:ext uri="{909E8E84-426E-40DD-AFC4-6F175D3DCCD1}">
+              <a14:hiddenFill xmlns:a14="http://schemas.microsoft.com/office/drawing/2010/main">
+                <a:solidFill>
+                  <a:srgbClr val="FFFFFF"/>
+                </a:solidFill>
+              </a14:hiddenFill>
+            </a:ext>
+          </a:extLst>
+        </p:spPr>
+      </p:pic>
+      <p:sp>
+        <p:nvSpPr>
+          <p:cNvPr id="5" name="TextBox 4">
+            <a:extLst>
+              <a:ext uri="{FF2B5EF4-FFF2-40B4-BE49-F238E27FC236}">
+                <a16:creationId xmlns:a16="http://schemas.microsoft.com/office/drawing/2014/main" id="{435DCA43-EF06-B24A-98C4-D63DF1418E8B}"/>
+              </a:ext>
+            </a:extLst>
+          </p:cNvPr>
+          <p:cNvSpPr txBox="1"/>
+          <p:nvPr/>
+        </p:nvSpPr>
+        <p:spPr>
+          <a:xfrm>
+            <a:off x="7104188" y="1883130"/>
+            <a:ext cx="609600" cy="369332"/>
+          </a:xfrm>
+          <a:prstGeom prst="rect">
+            <a:avLst/>
+          </a:prstGeom>
+          <a:noFill/>
+        </p:spPr>
+        <p:txBody>
+          <a:bodyPr wrap="square" rtlCol="0">
+            <a:spAutoFit/>
+          </a:bodyPr>
+          <a:lstStyle/>
+          <a:p>
+            <a:r>
+              <a:rPr lang="en-US" dirty="0"/>
+              <a:t>L2</a:t>
+            </a:r>
+          </a:p>
+        </p:txBody>
+      </p:sp>
+      <p:sp>
+        <p:nvSpPr>
+          <p:cNvPr id="9" name="TextBox 8">
+            <a:extLst>
+              <a:ext uri="{FF2B5EF4-FFF2-40B4-BE49-F238E27FC236}">
+                <a16:creationId xmlns:a16="http://schemas.microsoft.com/office/drawing/2014/main" id="{BCFCE3F2-940E-4B46-8C91-0DE400995B46}"/>
+              </a:ext>
+            </a:extLst>
+          </p:cNvPr>
+          <p:cNvSpPr txBox="1"/>
+          <p:nvPr/>
+        </p:nvSpPr>
+        <p:spPr>
+          <a:xfrm>
+            <a:off x="10485120" y="1883130"/>
+            <a:ext cx="609600" cy="369332"/>
+          </a:xfrm>
+          <a:prstGeom prst="rect">
+            <a:avLst/>
+          </a:prstGeom>
+          <a:noFill/>
+        </p:spPr>
+        <p:txBody>
+          <a:bodyPr wrap="square" rtlCol="0">
+            <a:spAutoFit/>
+          </a:bodyPr>
+          <a:lstStyle/>
+          <a:p>
+            <a:r>
+              <a:rPr lang="en-US" dirty="0"/>
+              <a:t>L1</a:t>
+            </a:r>
+          </a:p>
+        </p:txBody>
+      </p:sp>
     </p:spTree>
     <p:extLst>
       <p:ext uri="{BB962C8B-B14F-4D97-AF65-F5344CB8AC3E}">
@@ -13395,8 +13529,8 @@
           </a:p>
         </p:txBody>
       </p:sp>
-      <mc:AlternateContent xmlns:mc="http://schemas.openxmlformats.org/markup-compatibility/2006" xmlns:a14="http://schemas.microsoft.com/office/drawing/2010/main">
-        <mc:Choice Requires="a14">
+      <mc:AlternateContent xmlns:mc="http://schemas.openxmlformats.org/markup-compatibility/2006">
+        <mc:Choice xmlns:a14="http://schemas.microsoft.com/office/drawing/2010/main" Requires="a14">
           <p:sp>
             <p:nvSpPr>
               <p:cNvPr id="3" name="Content Placeholder 2">
@@ -13950,27 +14084,6 @@
                 <a:pPr lvl="1"/>
                 <a:r>
                   <a:rPr lang="en-US" dirty="0"/>
-                  <a:t>However, the cost function is convex </a:t>
-                </a:r>
-                <a14:m>
-                  <m:oMath xmlns:m="http://schemas.openxmlformats.org/officeDocument/2006/math">
-                    <m:r>
-                      <a:rPr lang="es-ES" b="0" i="1" smtClean="0">
-                        <a:latin typeface="Cambria Math" panose="02040503050406030204" pitchFamily="18" charset="0"/>
-                      </a:rPr>
-                      <m:t>⇒</m:t>
-                    </m:r>
-                  </m:oMath>
-                </a14:m>
-                <a:r>
-                  <a:rPr lang="en-US" dirty="0"/>
-                  <a:t> no local minima [See Unit 7]</a:t>
-                </a:r>
-              </a:p>
-              <a:p>
-                <a:pPr lvl="1"/>
-                <a:r>
-                  <a:rPr lang="en-US" dirty="0"/>
                   <a:t>Beyond the scope of this class</a:t>
                 </a:r>
               </a:p>
@@ -13988,7 +14101,7 @@
             </p:txBody>
           </p:sp>
         </mc:Choice>
-        <mc:Fallback xmlns="">
+        <mc:Fallback>
           <p:sp>
             <p:nvSpPr>
               <p:cNvPr id="3" name="Content Placeholder 2">
@@ -14009,7 +14122,7 @@
               <a:blipFill>
                 <a:blip r:embed="rId2"/>
                 <a:stretch>
-                  <a:fillRect l="-1455" t="-1549"/>
+                  <a:fillRect l="-1387" t="-18713"/>
                 </a:stretch>
               </a:blipFill>
             </p:spPr>
@@ -14246,37 +14359,6 @@
                                           <p:spTgt spid="3">
                                             <p:txEl>
                                               <p:pRg st="7" end="7"/>
-                                            </p:txEl>
-                                          </p:spTgt>
-                                        </p:tgtEl>
-                                        <p:attrNameLst>
-                                          <p:attrName>style.visibility</p:attrName>
-                                        </p:attrNameLst>
-                                      </p:cBhvr>
-                                      <p:to>
-                                        <p:strVal val="visible"/>
-                                      </p:to>
-                                    </p:set>
-                                  </p:childTnLst>
-                                </p:cTn>
-                              </p:par>
-                              <p:par>
-                                <p:cTn id="17" presetID="1" presetClass="entr" presetSubtype="0" fill="hold" nodeType="withEffect">
-                                  <p:stCondLst>
-                                    <p:cond delay="0"/>
-                                  </p:stCondLst>
-                                  <p:childTnLst>
-                                    <p:set>
-                                      <p:cBhvr>
-                                        <p:cTn id="18" dur="1" fill="hold">
-                                          <p:stCondLst>
-                                            <p:cond delay="0"/>
-                                          </p:stCondLst>
-                                        </p:cTn>
-                                        <p:tgtEl>
-                                          <p:spTgt spid="3">
-                                            <p:txEl>
-                                              <p:pRg st="8" end="8"/>
                                             </p:txEl>
                                           </p:spTgt>
                                         </p:tgtEl>
@@ -20279,8 +20361,8 @@
         </p:blipFill>
         <p:spPr>
           <a:xfrm>
-            <a:off x="5782024" y="2604047"/>
-            <a:ext cx="5124450" cy="2200275"/>
+            <a:off x="5065720" y="2051540"/>
+            <a:ext cx="6029000" cy="2588660"/>
           </a:xfrm>
           <a:prstGeom prst="rect">
             <a:avLst/>

</xml_diff>

<commit_message>
updated slides for lecture 4
</commit_message>
<xml_diff>
--- a/lectures/Lect05_Lasso.pptx
+++ b/lectures/Lect05_Lasso.pptx
@@ -298,7 +298,7 @@
           <a:p>
             <a:fld id="{B7D6DDD3-D7E9-488B-B626-1E8285E424D8}" type="datetimeFigureOut">
               <a:rPr lang="en-US" smtClean="0"/>
-              <a:t>3/1/21</a:t>
+              <a:t>9/27/21</a:t>
             </a:fld>
             <a:endParaRPr lang="en-US"/>
           </a:p>
@@ -4954,11 +4954,11 @@
           <a:p>
             <a:r>
               <a:rPr lang="en-US"/>
-              <a:t>EL-GY 6143</a:t>
+              <a:t>EL-GY 6143/CS-GY 6923:  </a:t>
             </a:r>
             <a:r>
               <a:rPr lang="en-US" dirty="0"/>
-              <a:t>:  Introduction to machine learning</a:t>
+              <a:t>Introduction to machine learning</a:t>
             </a:r>
           </a:p>
           <a:p>

</xml_diff>